<commit_message>
freed mtt. fixed delay. Working with current settings.
</commit_message>
<xml_diff>
--- a/documents/Presentation1.pptx
+++ b/documents/Presentation1.pptx
@@ -14,7 +14,8 @@
     <p:sldId id="264" r:id="rId8"/>
     <p:sldId id="262" r:id="rId9"/>
     <p:sldId id="265" r:id="rId10"/>
-    <p:sldId id="263" r:id="rId11"/>
+    <p:sldId id="266" r:id="rId11"/>
+    <p:sldId id="263" r:id="rId12"/>
   </p:sldIdLst>
   <p:sldSz cx="12192000" cy="6858000"/>
   <p:notesSz cx="6858000" cy="9144000"/>
@@ -113,6 +114,11 @@
       </a:defRPr>
     </a:lvl9pPr>
   </p:defaultTextStyle>
+  <p:extLst>
+    <p:ext uri="{EFAFB233-063F-42B5-8137-9DF3F51BA10A}">
+      <p15:sldGuideLst xmlns:p15="http://schemas.microsoft.com/office/powerpoint/2012/main"/>
+    </p:ext>
+  </p:extLst>
 </p:presentation>
 </file>
 
@@ -247,7 +253,7 @@
           <a:p>
             <a:fld id="{9F484138-F13D-4435-B236-907AA6087DE5}" type="datetimeFigureOut">
               <a:rPr lang="en-US" smtClean="0"/>
-              <a:t>3/18/2022</a:t>
+              <a:t>3/21/2022</a:t>
             </a:fld>
             <a:endParaRPr lang="en-US"/>
           </a:p>
@@ -417,7 +423,7 @@
           <a:p>
             <a:fld id="{9F484138-F13D-4435-B236-907AA6087DE5}" type="datetimeFigureOut">
               <a:rPr lang="en-US" smtClean="0"/>
-              <a:t>3/18/2022</a:t>
+              <a:t>3/21/2022</a:t>
             </a:fld>
             <a:endParaRPr lang="en-US"/>
           </a:p>
@@ -597,7 +603,7 @@
           <a:p>
             <a:fld id="{9F484138-F13D-4435-B236-907AA6087DE5}" type="datetimeFigureOut">
               <a:rPr lang="en-US" smtClean="0"/>
-              <a:t>3/18/2022</a:t>
+              <a:t>3/21/2022</a:t>
             </a:fld>
             <a:endParaRPr lang="en-US"/>
           </a:p>
@@ -767,7 +773,7 @@
           <a:p>
             <a:fld id="{9F484138-F13D-4435-B236-907AA6087DE5}" type="datetimeFigureOut">
               <a:rPr lang="en-US" smtClean="0"/>
-              <a:t>3/18/2022</a:t>
+              <a:t>3/21/2022</a:t>
             </a:fld>
             <a:endParaRPr lang="en-US"/>
           </a:p>
@@ -1013,7 +1019,7 @@
           <a:p>
             <a:fld id="{9F484138-F13D-4435-B236-907AA6087DE5}" type="datetimeFigureOut">
               <a:rPr lang="en-US" smtClean="0"/>
-              <a:t>3/18/2022</a:t>
+              <a:t>3/21/2022</a:t>
             </a:fld>
             <a:endParaRPr lang="en-US"/>
           </a:p>
@@ -1245,7 +1251,7 @@
           <a:p>
             <a:fld id="{9F484138-F13D-4435-B236-907AA6087DE5}" type="datetimeFigureOut">
               <a:rPr lang="en-US" smtClean="0"/>
-              <a:t>3/18/2022</a:t>
+              <a:t>3/21/2022</a:t>
             </a:fld>
             <a:endParaRPr lang="en-US"/>
           </a:p>
@@ -1612,7 +1618,7 @@
           <a:p>
             <a:fld id="{9F484138-F13D-4435-B236-907AA6087DE5}" type="datetimeFigureOut">
               <a:rPr lang="en-US" smtClean="0"/>
-              <a:t>3/18/2022</a:t>
+              <a:t>3/21/2022</a:t>
             </a:fld>
             <a:endParaRPr lang="en-US"/>
           </a:p>
@@ -1730,7 +1736,7 @@
           <a:p>
             <a:fld id="{9F484138-F13D-4435-B236-907AA6087DE5}" type="datetimeFigureOut">
               <a:rPr lang="en-US" smtClean="0"/>
-              <a:t>3/18/2022</a:t>
+              <a:t>3/21/2022</a:t>
             </a:fld>
             <a:endParaRPr lang="en-US"/>
           </a:p>
@@ -1825,7 +1831,7 @@
           <a:p>
             <a:fld id="{9F484138-F13D-4435-B236-907AA6087DE5}" type="datetimeFigureOut">
               <a:rPr lang="en-US" smtClean="0"/>
-              <a:t>3/18/2022</a:t>
+              <a:t>3/21/2022</a:t>
             </a:fld>
             <a:endParaRPr lang="en-US"/>
           </a:p>
@@ -2102,7 +2108,7 @@
           <a:p>
             <a:fld id="{9F484138-F13D-4435-B236-907AA6087DE5}" type="datetimeFigureOut">
               <a:rPr lang="en-US" smtClean="0"/>
-              <a:t>3/18/2022</a:t>
+              <a:t>3/21/2022</a:t>
             </a:fld>
             <a:endParaRPr lang="en-US"/>
           </a:p>
@@ -2355,7 +2361,7 @@
           <a:p>
             <a:fld id="{9F484138-F13D-4435-B236-907AA6087DE5}" type="datetimeFigureOut">
               <a:rPr lang="en-US" smtClean="0"/>
-              <a:t>3/18/2022</a:t>
+              <a:t>3/21/2022</a:t>
             </a:fld>
             <a:endParaRPr lang="en-US"/>
           </a:p>
@@ -2568,7 +2574,7 @@
           <a:p>
             <a:fld id="{9F484138-F13D-4435-B236-907AA6087DE5}" type="datetimeFigureOut">
               <a:rPr lang="en-US" smtClean="0"/>
-              <a:t>3/18/2022</a:t>
+              <a:t>3/21/2022</a:t>
             </a:fld>
             <a:endParaRPr lang="en-US"/>
           </a:p>
@@ -3041,6 +3047,224 @@
           <a:chExt cx="0" cy="0"/>
         </a:xfrm>
       </p:grpSpPr>
+      <p:pic>
+        <p:nvPicPr>
+          <p:cNvPr id="7" name="Picture 6"/>
+          <p:cNvPicPr>
+            <a:picLocks noChangeAspect="1"/>
+          </p:cNvPicPr>
+          <p:nvPr/>
+        </p:nvPicPr>
+        <p:blipFill>
+          <a:blip r:embed="rId2"/>
+          <a:stretch>
+            <a:fillRect/>
+          </a:stretch>
+        </p:blipFill>
+        <p:spPr>
+          <a:xfrm>
+            <a:off x="223837" y="3043237"/>
+            <a:ext cx="5587884" cy="3062287"/>
+          </a:xfrm>
+          <a:prstGeom prst="rect">
+            <a:avLst/>
+          </a:prstGeom>
+        </p:spPr>
+      </p:pic>
+      <p:sp>
+        <p:nvSpPr>
+          <p:cNvPr id="2" name="Title 1"/>
+          <p:cNvSpPr>
+            <a:spLocks noGrp="1"/>
+          </p:cNvSpPr>
+          <p:nvPr>
+            <p:ph type="title"/>
+          </p:nvPr>
+        </p:nvSpPr>
+        <p:spPr>
+          <a:xfrm>
+            <a:off x="907990" y="2114647"/>
+            <a:ext cx="4219577" cy="1220788"/>
+          </a:xfrm>
+        </p:spPr>
+        <p:txBody>
+          <a:bodyPr>
+            <a:normAutofit/>
+          </a:bodyPr>
+          <a:lstStyle/>
+          <a:p>
+            <a:r>
+              <a:rPr lang="en-US" sz="2400" dirty="0" smtClean="0"/>
+              <a:t>Free MTT </a:t>
+            </a:r>
+            <a:r>
+              <a:rPr lang="en-US" sz="2400" dirty="0" smtClean="0"/>
+              <a:t>spatial </a:t>
+            </a:r>
+            <a:r>
+              <a:rPr lang="en-US" sz="2400" dirty="0" smtClean="0"/>
+              <a:t>filter (2.5, </a:t>
+            </a:r>
+            <a:r>
+              <a:rPr lang="en-US" sz="2400" dirty="0" smtClean="0"/>
+              <a:t>2.5)</a:t>
+            </a:r>
+            <a:endParaRPr lang="en-US" sz="2400" dirty="0"/>
+          </a:p>
+        </p:txBody>
+      </p:sp>
+      <p:sp>
+        <p:nvSpPr>
+          <p:cNvPr id="3" name="Content Placeholder 2"/>
+          <p:cNvSpPr>
+            <a:spLocks noGrp="1"/>
+          </p:cNvSpPr>
+          <p:nvPr>
+            <p:ph idx="1"/>
+          </p:nvPr>
+        </p:nvSpPr>
+        <p:spPr>
+          <a:xfrm>
+            <a:off x="0" y="71808"/>
+            <a:ext cx="9644063" cy="942605"/>
+          </a:xfrm>
+        </p:spPr>
+        <p:txBody>
+          <a:bodyPr>
+            <a:normAutofit/>
+          </a:bodyPr>
+          <a:lstStyle/>
+          <a:p>
+            <a:pPr marL="0" indent="0">
+              <a:buNone/>
+            </a:pPr>
+            <a:r>
+              <a:rPr lang="nl-NL" sz="1600" dirty="0" err="1" smtClean="0"/>
+              <a:t>Note</a:t>
+            </a:r>
+            <a:r>
+              <a:rPr lang="nl-NL" sz="1600" dirty="0" smtClean="0"/>
+              <a:t>: different </a:t>
+            </a:r>
+            <a:r>
+              <a:rPr lang="nl-NL" sz="1600" dirty="0" err="1" smtClean="0"/>
+              <a:t>scale</a:t>
+            </a:r>
+            <a:endParaRPr lang="en-US" sz="1600" dirty="0"/>
+          </a:p>
+        </p:txBody>
+      </p:sp>
+      <p:pic>
+        <p:nvPicPr>
+          <p:cNvPr id="8" name="Picture 7"/>
+          <p:cNvPicPr>
+            <a:picLocks noChangeAspect="1"/>
+          </p:cNvPicPr>
+          <p:nvPr/>
+        </p:nvPicPr>
+        <p:blipFill>
+          <a:blip r:embed="rId3"/>
+          <a:stretch>
+            <a:fillRect/>
+          </a:stretch>
+        </p:blipFill>
+        <p:spPr>
+          <a:xfrm>
+            <a:off x="5811721" y="3335435"/>
+            <a:ext cx="5749033" cy="2770089"/>
+          </a:xfrm>
+          <a:prstGeom prst="rect">
+            <a:avLst/>
+          </a:prstGeom>
+        </p:spPr>
+      </p:pic>
+      <p:sp>
+        <p:nvSpPr>
+          <p:cNvPr id="9" name="Title 1"/>
+          <p:cNvSpPr txBox="1">
+            <a:spLocks/>
+          </p:cNvSpPr>
+          <p:nvPr/>
+        </p:nvSpPr>
+        <p:spPr>
+          <a:xfrm>
+            <a:off x="6889690" y="2114647"/>
+            <a:ext cx="4219577" cy="1220788"/>
+          </a:xfrm>
+          <a:prstGeom prst="rect">
+            <a:avLst/>
+          </a:prstGeom>
+        </p:spPr>
+        <p:txBody>
+          <a:bodyPr vert="horz" lIns="91440" tIns="45720" rIns="91440" bIns="45720" rtlCol="0" anchor="ctr">
+            <a:normAutofit/>
+          </a:bodyPr>
+          <a:lstStyle>
+            <a:lvl1pPr algn="l" defTabSz="914400" rtl="0" eaLnBrk="1" latinLnBrk="0" hangingPunct="1">
+              <a:lnSpc>
+                <a:spcPct val="90000"/>
+              </a:lnSpc>
+              <a:spcBef>
+                <a:spcPct val="0"/>
+              </a:spcBef>
+              <a:buNone/>
+              <a:defRPr sz="4400" kern="1200">
+                <a:solidFill>
+                  <a:schemeClr val="tx1"/>
+                </a:solidFill>
+                <a:latin typeface="+mj-lt"/>
+                <a:ea typeface="+mj-ea"/>
+                <a:cs typeface="+mj-cs"/>
+              </a:defRPr>
+            </a:lvl1pPr>
+          </a:lstStyle>
+          <a:p>
+            <a:r>
+              <a:rPr lang="en-US" sz="2400" dirty="0" smtClean="0"/>
+              <a:t>Free MTT </a:t>
+            </a:r>
+            <a:r>
+              <a:rPr lang="en-US" sz="2400" dirty="0" err="1" smtClean="0"/>
+              <a:t>spatio</a:t>
+            </a:r>
+            <a:r>
+              <a:rPr lang="en-US" sz="2400" dirty="0" smtClean="0"/>
+              <a:t>-temporal filter (2.5, 2.5, 1.25)</a:t>
+            </a:r>
+            <a:endParaRPr lang="en-US" sz="2400" dirty="0"/>
+          </a:p>
+        </p:txBody>
+      </p:sp>
+    </p:spTree>
+    <p:extLst>
+      <p:ext uri="{BB962C8B-B14F-4D97-AF65-F5344CB8AC3E}">
+        <p14:creationId xmlns:p14="http://schemas.microsoft.com/office/powerpoint/2010/main" val="1105223976"/>
+      </p:ext>
+    </p:extLst>
+  </p:cSld>
+  <p:clrMapOvr>
+    <a:masterClrMapping/>
+  </p:clrMapOvr>
+</p:sld>
+</file>
+
+<file path=ppt/slides/slide11.xml><?xml version="1.0" encoding="utf-8"?>
+<p:sld xmlns:a="http://schemas.openxmlformats.org/drawingml/2006/main" xmlns:r="http://schemas.openxmlformats.org/officeDocument/2006/relationships" xmlns:p="http://schemas.openxmlformats.org/presentationml/2006/main">
+  <p:cSld>
+    <p:spTree>
+      <p:nvGrpSpPr>
+        <p:cNvPr id="1" name=""/>
+        <p:cNvGrpSpPr/>
+        <p:nvPr/>
+      </p:nvGrpSpPr>
+      <p:grpSpPr>
+        <a:xfrm>
+          <a:off x="0" y="0"/>
+          <a:ext cx="0" cy="0"/>
+          <a:chOff x="0" y="0"/>
+          <a:chExt cx="0" cy="0"/>
+        </a:xfrm>
+      </p:grpSpPr>
       <p:sp>
         <p:nvSpPr>
           <p:cNvPr id="2" name="Title 1"/>
@@ -3089,7 +3313,133 @@
             </a:r>
             <a:r>
               <a:rPr lang="en-US" dirty="0" smtClean="0"/>
-              <a:t> or do I merely use it to assess how the method works for delayed curves?</a:t>
+              <a:t> or do I merely use it to assess how the method works for delayed curves</a:t>
+            </a:r>
+            <a:r>
+              <a:rPr lang="en-US" dirty="0" smtClean="0"/>
+              <a:t>?</a:t>
+            </a:r>
+          </a:p>
+          <a:p>
+            <a:r>
+              <a:rPr lang="nl-NL" dirty="0" smtClean="0"/>
+              <a:t>I </a:t>
+            </a:r>
+            <a:r>
+              <a:rPr lang="nl-NL" dirty="0" err="1" smtClean="0"/>
+              <a:t>dont</a:t>
+            </a:r>
+            <a:r>
+              <a:rPr lang="nl-NL" dirty="0" smtClean="0"/>
+              <a:t> </a:t>
+            </a:r>
+            <a:r>
+              <a:rPr lang="nl-NL" dirty="0" err="1" smtClean="0"/>
+              <a:t>know</a:t>
+            </a:r>
+            <a:r>
+              <a:rPr lang="nl-NL" dirty="0" smtClean="0"/>
+              <a:t> </a:t>
+            </a:r>
+            <a:r>
+              <a:rPr lang="nl-NL" dirty="0" err="1" smtClean="0"/>
+              <a:t>if</a:t>
+            </a:r>
+            <a:r>
+              <a:rPr lang="nl-NL" dirty="0" smtClean="0"/>
+              <a:t> </a:t>
+            </a:r>
+            <a:r>
+              <a:rPr lang="nl-NL" dirty="0" err="1" smtClean="0"/>
+              <a:t>my</a:t>
+            </a:r>
+            <a:r>
+              <a:rPr lang="nl-NL" dirty="0" smtClean="0"/>
+              <a:t> </a:t>
+            </a:r>
+            <a:r>
+              <a:rPr lang="nl-NL" dirty="0" err="1" smtClean="0"/>
+              <a:t>spatial</a:t>
+            </a:r>
+            <a:r>
+              <a:rPr lang="nl-NL" dirty="0" smtClean="0"/>
+              <a:t> </a:t>
+            </a:r>
+            <a:r>
+              <a:rPr lang="nl-NL" dirty="0" err="1" smtClean="0"/>
+              <a:t>gaussian</a:t>
+            </a:r>
+            <a:r>
+              <a:rPr lang="nl-NL" dirty="0" smtClean="0"/>
+              <a:t> filter is </a:t>
+            </a:r>
+            <a:r>
+              <a:rPr lang="nl-NL" dirty="0" err="1" smtClean="0"/>
+              <a:t>the</a:t>
+            </a:r>
+            <a:r>
+              <a:rPr lang="nl-NL" dirty="0" smtClean="0"/>
+              <a:t> </a:t>
+            </a:r>
+            <a:r>
+              <a:rPr lang="nl-NL" dirty="0" err="1" smtClean="0"/>
+              <a:t>same</a:t>
+            </a:r>
+            <a:r>
+              <a:rPr lang="nl-NL" dirty="0"/>
+              <a:t> </a:t>
+            </a:r>
+            <a:r>
+              <a:rPr lang="nl-NL" dirty="0" smtClean="0"/>
+              <a:t>as Edwins. No filter </a:t>
+            </a:r>
+            <a:r>
+              <a:rPr lang="nl-NL" dirty="0" err="1" smtClean="0"/>
+              <a:t>size</a:t>
+            </a:r>
+            <a:r>
+              <a:rPr lang="nl-NL" dirty="0" smtClean="0"/>
+              <a:t> </a:t>
+            </a:r>
+            <a:r>
+              <a:rPr lang="nl-NL" dirty="0" err="1" smtClean="0"/>
+              <a:t>defined</a:t>
+            </a:r>
+            <a:r>
+              <a:rPr lang="nl-NL" dirty="0" smtClean="0"/>
+              <a:t>, </a:t>
+            </a:r>
+            <a:r>
+              <a:rPr lang="nl-NL" dirty="0" err="1" smtClean="0"/>
+              <a:t>only</a:t>
+            </a:r>
+            <a:r>
+              <a:rPr lang="nl-NL" dirty="0" smtClean="0"/>
+              <a:t> standard </a:t>
+            </a:r>
+            <a:r>
+              <a:rPr lang="nl-NL" dirty="0" err="1" smtClean="0"/>
+              <a:t>deviation</a:t>
+            </a:r>
+            <a:r>
+              <a:rPr lang="nl-NL" dirty="0" smtClean="0"/>
+              <a:t>. Will </a:t>
+            </a:r>
+            <a:r>
+              <a:rPr lang="nl-NL" dirty="0" err="1" smtClean="0"/>
+              <a:t>it</a:t>
+            </a:r>
+            <a:r>
+              <a:rPr lang="nl-NL" dirty="0" smtClean="0"/>
+              <a:t> make a </a:t>
+            </a:r>
+            <a:r>
+              <a:rPr lang="nl-NL" dirty="0" err="1" smtClean="0"/>
+              <a:t>difference</a:t>
+            </a:r>
+            <a:r>
+              <a:rPr lang="nl-NL" dirty="0" smtClean="0"/>
+              <a:t>?</a:t>
             </a:r>
             <a:endParaRPr lang="en-US" dirty="0"/>
           </a:p>

</xml_diff>

<commit_message>
Fixed correction factor. Only large MTT giving some issues.. If you run this, best result up to now.
</commit_message>
<xml_diff>
--- a/documents/Presentation1.pptx
+++ b/documents/Presentation1.pptx
@@ -16,6 +16,7 @@
     <p:sldId id="265" r:id="rId10"/>
     <p:sldId id="266" r:id="rId11"/>
     <p:sldId id="263" r:id="rId12"/>
+    <p:sldId id="267" r:id="rId13"/>
   </p:sldIdLst>
   <p:sldSz cx="12192000" cy="6858000"/>
   <p:notesSz cx="6858000" cy="9144000"/>
@@ -253,7 +254,7 @@
           <a:p>
             <a:fld id="{9F484138-F13D-4435-B236-907AA6087DE5}" type="datetimeFigureOut">
               <a:rPr lang="en-US" smtClean="0"/>
-              <a:t>3/21/2022</a:t>
+              <a:t>3/22/2022</a:t>
             </a:fld>
             <a:endParaRPr lang="en-US"/>
           </a:p>
@@ -423,7 +424,7 @@
           <a:p>
             <a:fld id="{9F484138-F13D-4435-B236-907AA6087DE5}" type="datetimeFigureOut">
               <a:rPr lang="en-US" smtClean="0"/>
-              <a:t>3/21/2022</a:t>
+              <a:t>3/22/2022</a:t>
             </a:fld>
             <a:endParaRPr lang="en-US"/>
           </a:p>
@@ -603,7 +604,7 @@
           <a:p>
             <a:fld id="{9F484138-F13D-4435-B236-907AA6087DE5}" type="datetimeFigureOut">
               <a:rPr lang="en-US" smtClean="0"/>
-              <a:t>3/21/2022</a:t>
+              <a:t>3/22/2022</a:t>
             </a:fld>
             <a:endParaRPr lang="en-US"/>
           </a:p>
@@ -773,7 +774,7 @@
           <a:p>
             <a:fld id="{9F484138-F13D-4435-B236-907AA6087DE5}" type="datetimeFigureOut">
               <a:rPr lang="en-US" smtClean="0"/>
-              <a:t>3/21/2022</a:t>
+              <a:t>3/22/2022</a:t>
             </a:fld>
             <a:endParaRPr lang="en-US"/>
           </a:p>
@@ -1019,7 +1020,7 @@
           <a:p>
             <a:fld id="{9F484138-F13D-4435-B236-907AA6087DE5}" type="datetimeFigureOut">
               <a:rPr lang="en-US" smtClean="0"/>
-              <a:t>3/21/2022</a:t>
+              <a:t>3/22/2022</a:t>
             </a:fld>
             <a:endParaRPr lang="en-US"/>
           </a:p>
@@ -1251,7 +1252,7 @@
           <a:p>
             <a:fld id="{9F484138-F13D-4435-B236-907AA6087DE5}" type="datetimeFigureOut">
               <a:rPr lang="en-US" smtClean="0"/>
-              <a:t>3/21/2022</a:t>
+              <a:t>3/22/2022</a:t>
             </a:fld>
             <a:endParaRPr lang="en-US"/>
           </a:p>
@@ -1618,7 +1619,7 @@
           <a:p>
             <a:fld id="{9F484138-F13D-4435-B236-907AA6087DE5}" type="datetimeFigureOut">
               <a:rPr lang="en-US" smtClean="0"/>
-              <a:t>3/21/2022</a:t>
+              <a:t>3/22/2022</a:t>
             </a:fld>
             <a:endParaRPr lang="en-US"/>
           </a:p>
@@ -1736,7 +1737,7 @@
           <a:p>
             <a:fld id="{9F484138-F13D-4435-B236-907AA6087DE5}" type="datetimeFigureOut">
               <a:rPr lang="en-US" smtClean="0"/>
-              <a:t>3/21/2022</a:t>
+              <a:t>3/22/2022</a:t>
             </a:fld>
             <a:endParaRPr lang="en-US"/>
           </a:p>
@@ -1831,7 +1832,7 @@
           <a:p>
             <a:fld id="{9F484138-F13D-4435-B236-907AA6087DE5}" type="datetimeFigureOut">
               <a:rPr lang="en-US" smtClean="0"/>
-              <a:t>3/21/2022</a:t>
+              <a:t>3/22/2022</a:t>
             </a:fld>
             <a:endParaRPr lang="en-US"/>
           </a:p>
@@ -2108,7 +2109,7 @@
           <a:p>
             <a:fld id="{9F484138-F13D-4435-B236-907AA6087DE5}" type="datetimeFigureOut">
               <a:rPr lang="en-US" smtClean="0"/>
-              <a:t>3/21/2022</a:t>
+              <a:t>3/22/2022</a:t>
             </a:fld>
             <a:endParaRPr lang="en-US"/>
           </a:p>
@@ -2361,7 +2362,7 @@
           <a:p>
             <a:fld id="{9F484138-F13D-4435-B236-907AA6087DE5}" type="datetimeFigureOut">
               <a:rPr lang="en-US" smtClean="0"/>
-              <a:t>3/21/2022</a:t>
+              <a:t>3/22/2022</a:t>
             </a:fld>
             <a:endParaRPr lang="en-US"/>
           </a:p>
@@ -2574,7 +2575,7 @@
           <a:p>
             <a:fld id="{9F484138-F13D-4435-B236-907AA6087DE5}" type="datetimeFigureOut">
               <a:rPr lang="en-US" smtClean="0"/>
-              <a:t>3/21/2022</a:t>
+              <a:t>3/22/2022</a:t>
             </a:fld>
             <a:endParaRPr lang="en-US"/>
           </a:p>
@@ -3095,19 +3096,7 @@
           <a:p>
             <a:r>
               <a:rPr lang="en-US" sz="2400" dirty="0" smtClean="0"/>
-              <a:t>Free MTT </a:t>
-            </a:r>
-            <a:r>
-              <a:rPr lang="en-US" sz="2400" dirty="0" smtClean="0"/>
-              <a:t>spatial </a:t>
-            </a:r>
-            <a:r>
-              <a:rPr lang="en-US" sz="2400" dirty="0" smtClean="0"/>
-              <a:t>filter (2.5, </a:t>
-            </a:r>
-            <a:r>
-              <a:rPr lang="en-US" sz="2400" dirty="0" smtClean="0"/>
-              <a:t>2.5)</a:t>
+              <a:t>Free MTT spatial filter (2.5, 2.5)</a:t>
             </a:r>
             <a:endParaRPr lang="en-US" sz="2400" dirty="0"/>
           </a:p>
@@ -3313,11 +3302,7 @@
             </a:r>
             <a:r>
               <a:rPr lang="en-US" dirty="0" smtClean="0"/>
-              <a:t> or do I merely use it to assess how the method works for delayed curves</a:t>
-            </a:r>
-            <a:r>
-              <a:rPr lang="en-US" dirty="0" smtClean="0"/>
-              <a:t>?</a:t>
+              <a:t> or do I merely use it to assess how the method works for delayed curves?</a:t>
             </a:r>
           </a:p>
           <a:p>
@@ -3449,6 +3434,81 @@
     <p:extLst>
       <p:ext uri="{BB962C8B-B14F-4D97-AF65-F5344CB8AC3E}">
         <p14:creationId xmlns:p14="http://schemas.microsoft.com/office/powerpoint/2010/main" val="2690485706"/>
+      </p:ext>
+    </p:extLst>
+  </p:cSld>
+  <p:clrMapOvr>
+    <a:masterClrMapping/>
+  </p:clrMapOvr>
+</p:sld>
+</file>
+
+<file path=ppt/slides/slide12.xml><?xml version="1.0" encoding="utf-8"?>
+<p:sld xmlns:a="http://schemas.openxmlformats.org/drawingml/2006/main" xmlns:r="http://schemas.openxmlformats.org/officeDocument/2006/relationships" xmlns:p="http://schemas.openxmlformats.org/presentationml/2006/main">
+  <p:cSld>
+    <p:spTree>
+      <p:nvGrpSpPr>
+        <p:cNvPr id="1" name=""/>
+        <p:cNvGrpSpPr/>
+        <p:nvPr/>
+      </p:nvGrpSpPr>
+      <p:grpSpPr>
+        <a:xfrm>
+          <a:off x="0" y="0"/>
+          <a:ext cx="0" cy="0"/>
+          <a:chOff x="0" y="0"/>
+          <a:chExt cx="0" cy="0"/>
+        </a:xfrm>
+      </p:grpSpPr>
+      <p:sp>
+        <p:nvSpPr>
+          <p:cNvPr id="2" name="Title 1"/>
+          <p:cNvSpPr>
+            <a:spLocks noGrp="1"/>
+          </p:cNvSpPr>
+          <p:nvPr>
+            <p:ph type="title"/>
+          </p:nvPr>
+        </p:nvSpPr>
+        <p:spPr/>
+        <p:txBody>
+          <a:bodyPr/>
+          <a:lstStyle/>
+          <a:p>
+            <a:endParaRPr lang="en-US"/>
+          </a:p>
+        </p:txBody>
+      </p:sp>
+      <p:pic>
+        <p:nvPicPr>
+          <p:cNvPr id="4" name="Content Placeholder 3"/>
+          <p:cNvPicPr>
+            <a:picLocks noGrp="1" noChangeAspect="1"/>
+          </p:cNvPicPr>
+          <p:nvPr>
+            <p:ph idx="1"/>
+          </p:nvPr>
+        </p:nvPicPr>
+        <p:blipFill>
+          <a:blip r:embed="rId2"/>
+          <a:stretch>
+            <a:fillRect/>
+          </a:stretch>
+        </p:blipFill>
+        <p:spPr>
+          <a:xfrm>
+            <a:off x="1914187" y="1027906"/>
+            <a:ext cx="7801314" cy="5870143"/>
+          </a:xfrm>
+          <a:prstGeom prst="rect">
+            <a:avLst/>
+          </a:prstGeom>
+        </p:spPr>
+      </p:pic>
+    </p:spTree>
+    <p:extLst>
+      <p:ext uri="{BB962C8B-B14F-4D97-AF65-F5344CB8AC3E}">
+        <p14:creationId xmlns:p14="http://schemas.microsoft.com/office/powerpoint/2010/main" val="967558884"/>
       </p:ext>
     </p:extLst>
   </p:cSld>

</xml_diff>

<commit_message>
implemented wandb, logging parametersm, plots, with sweep files.
</commit_message>
<xml_diff>
--- a/documents/Presentation1.pptx
+++ b/documents/Presentation1.pptx
@@ -254,7 +254,7 @@
           <a:p>
             <a:fld id="{9F484138-F13D-4435-B236-907AA6087DE5}" type="datetimeFigureOut">
               <a:rPr lang="en-US" smtClean="0"/>
-              <a:t>3/22/2022</a:t>
+              <a:t>3/29/2022</a:t>
             </a:fld>
             <a:endParaRPr lang="en-US"/>
           </a:p>
@@ -424,7 +424,7 @@
           <a:p>
             <a:fld id="{9F484138-F13D-4435-B236-907AA6087DE5}" type="datetimeFigureOut">
               <a:rPr lang="en-US" smtClean="0"/>
-              <a:t>3/22/2022</a:t>
+              <a:t>3/29/2022</a:t>
             </a:fld>
             <a:endParaRPr lang="en-US"/>
           </a:p>
@@ -604,7 +604,7 @@
           <a:p>
             <a:fld id="{9F484138-F13D-4435-B236-907AA6087DE5}" type="datetimeFigureOut">
               <a:rPr lang="en-US" smtClean="0"/>
-              <a:t>3/22/2022</a:t>
+              <a:t>3/29/2022</a:t>
             </a:fld>
             <a:endParaRPr lang="en-US"/>
           </a:p>
@@ -774,7 +774,7 @@
           <a:p>
             <a:fld id="{9F484138-F13D-4435-B236-907AA6087DE5}" type="datetimeFigureOut">
               <a:rPr lang="en-US" smtClean="0"/>
-              <a:t>3/22/2022</a:t>
+              <a:t>3/29/2022</a:t>
             </a:fld>
             <a:endParaRPr lang="en-US"/>
           </a:p>
@@ -1020,7 +1020,7 @@
           <a:p>
             <a:fld id="{9F484138-F13D-4435-B236-907AA6087DE5}" type="datetimeFigureOut">
               <a:rPr lang="en-US" smtClean="0"/>
-              <a:t>3/22/2022</a:t>
+              <a:t>3/29/2022</a:t>
             </a:fld>
             <a:endParaRPr lang="en-US"/>
           </a:p>
@@ -1252,7 +1252,7 @@
           <a:p>
             <a:fld id="{9F484138-F13D-4435-B236-907AA6087DE5}" type="datetimeFigureOut">
               <a:rPr lang="en-US" smtClean="0"/>
-              <a:t>3/22/2022</a:t>
+              <a:t>3/29/2022</a:t>
             </a:fld>
             <a:endParaRPr lang="en-US"/>
           </a:p>
@@ -1619,7 +1619,7 @@
           <a:p>
             <a:fld id="{9F484138-F13D-4435-B236-907AA6087DE5}" type="datetimeFigureOut">
               <a:rPr lang="en-US" smtClean="0"/>
-              <a:t>3/22/2022</a:t>
+              <a:t>3/29/2022</a:t>
             </a:fld>
             <a:endParaRPr lang="en-US"/>
           </a:p>
@@ -1737,7 +1737,7 @@
           <a:p>
             <a:fld id="{9F484138-F13D-4435-B236-907AA6087DE5}" type="datetimeFigureOut">
               <a:rPr lang="en-US" smtClean="0"/>
-              <a:t>3/22/2022</a:t>
+              <a:t>3/29/2022</a:t>
             </a:fld>
             <a:endParaRPr lang="en-US"/>
           </a:p>
@@ -1832,7 +1832,7 @@
           <a:p>
             <a:fld id="{9F484138-F13D-4435-B236-907AA6087DE5}" type="datetimeFigureOut">
               <a:rPr lang="en-US" smtClean="0"/>
-              <a:t>3/22/2022</a:t>
+              <a:t>3/29/2022</a:t>
             </a:fld>
             <a:endParaRPr lang="en-US"/>
           </a:p>
@@ -2109,7 +2109,7 @@
           <a:p>
             <a:fld id="{9F484138-F13D-4435-B236-907AA6087DE5}" type="datetimeFigureOut">
               <a:rPr lang="en-US" smtClean="0"/>
-              <a:t>3/22/2022</a:t>
+              <a:t>3/29/2022</a:t>
             </a:fld>
             <a:endParaRPr lang="en-US"/>
           </a:p>
@@ -2362,7 +2362,7 @@
           <a:p>
             <a:fld id="{9F484138-F13D-4435-B236-907AA6087DE5}" type="datetimeFigureOut">
               <a:rPr lang="en-US" smtClean="0"/>
-              <a:t>3/22/2022</a:t>
+              <a:t>3/29/2022</a:t>
             </a:fld>
             <a:endParaRPr lang="en-US"/>
           </a:p>
@@ -2575,7 +2575,7 @@
           <a:p>
             <a:fld id="{9F484138-F13D-4435-B236-907AA6087DE5}" type="datetimeFigureOut">
               <a:rPr lang="en-US" smtClean="0"/>
-              <a:t>3/22/2022</a:t>
+              <a:t>3/29/2022</a:t>
             </a:fld>
             <a:endParaRPr lang="en-US"/>
           </a:p>
@@ -3497,7 +3497,7 @@
         </p:blipFill>
         <p:spPr>
           <a:xfrm>
-            <a:off x="1914187" y="1027906"/>
+            <a:off x="1418887" y="570706"/>
             <a:ext cx="7801314" cy="5870143"/>
           </a:xfrm>
           <a:prstGeom prst="rect">

</xml_diff>